<commit_message>
live versions add notebooks
</commit_message>
<xml_diff>
--- a/presentations/anonymization_for_medical_image_processing.pptx
+++ b/presentations/anonymization_for_medical_image_processing.pptx
@@ -6,7 +6,7 @@
     <p:sldMasterId id="2147483776" r:id="rId2"/>
   </p:sldMasterIdLst>
   <p:notesMasterIdLst>
-    <p:notesMasterId r:id="rId10"/>
+    <p:notesMasterId r:id="rId12"/>
   </p:notesMasterIdLst>
   <p:sldIdLst>
     <p:sldId id="273" r:id="rId3"/>
@@ -16,6 +16,8 @@
     <p:sldId id="281" r:id="rId7"/>
     <p:sldId id="277" r:id="rId8"/>
     <p:sldId id="285" r:id="rId9"/>
+    <p:sldId id="287" r:id="rId10"/>
+    <p:sldId id="286" r:id="rId11"/>
   </p:sldIdLst>
   <p:sldSz cx="12192000" cy="6858000"/>
   <p:notesSz cx="6858000" cy="9144000"/>
@@ -203,7 +205,7 @@
           </a:lstStyle>
           <a:p>
             <a:fld id="{69732D9D-C667-489A-831F-0E01110209EA}" type="datetimeFigureOut">
-              <a:t>08/10/2024</a:t>
+              <a:t>09/12/2024</a:t>
             </a:fld>
             <a:endParaRPr lang="en-US"/>
           </a:p>
@@ -1057,6 +1059,174 @@
 </p:notes>
 </file>
 
+<file path=ppt/notesSlides/notesSlide8.xml><?xml version="1.0" encoding="utf-8"?>
+<p:notes xmlns:a="http://schemas.openxmlformats.org/drawingml/2006/main" xmlns:r="http://schemas.openxmlformats.org/officeDocument/2006/relationships" xmlns:p="http://schemas.openxmlformats.org/presentationml/2006/main">
+  <p:cSld>
+    <p:spTree>
+      <p:nvGrpSpPr>
+        <p:cNvPr id="1" name=""/>
+        <p:cNvGrpSpPr/>
+        <p:nvPr/>
+      </p:nvGrpSpPr>
+      <p:grpSpPr>
+        <a:xfrm>
+          <a:off x="0" y="0"/>
+          <a:ext cx="0" cy="0"/>
+          <a:chOff x="0" y="0"/>
+          <a:chExt cx="0" cy="0"/>
+        </a:xfrm>
+      </p:grpSpPr>
+      <p:sp>
+        <p:nvSpPr>
+          <p:cNvPr id="2" name="Slide Image Placeholder 1"/>
+          <p:cNvSpPr>
+            <a:spLocks noGrp="1" noRot="1" noChangeAspect="1"/>
+          </p:cNvSpPr>
+          <p:nvPr>
+            <p:ph type="sldImg"/>
+          </p:nvPr>
+        </p:nvSpPr>
+        <p:spPr/>
+      </p:sp>
+      <p:sp>
+        <p:nvSpPr>
+          <p:cNvPr id="3" name="Notes Placeholder 2"/>
+          <p:cNvSpPr>
+            <a:spLocks noGrp="1"/>
+          </p:cNvSpPr>
+          <p:nvPr>
+            <p:ph type="body" idx="1"/>
+          </p:nvPr>
+        </p:nvSpPr>
+        <p:spPr/>
+        <p:txBody>
+          <a:bodyPr/>
+          <a:lstStyle/>
+          <a:p>
+            <a:endParaRPr lang="LID4096" dirty="0"/>
+          </a:p>
+        </p:txBody>
+      </p:sp>
+      <p:sp>
+        <p:nvSpPr>
+          <p:cNvPr id="4" name="Slide Number Placeholder 3"/>
+          <p:cNvSpPr>
+            <a:spLocks noGrp="1"/>
+          </p:cNvSpPr>
+          <p:nvPr>
+            <p:ph type="sldNum" sz="quarter" idx="5"/>
+          </p:nvPr>
+        </p:nvSpPr>
+        <p:spPr/>
+        <p:txBody>
+          <a:bodyPr/>
+          <a:lstStyle/>
+          <a:p>
+            <a:fld id="{413FF387-57CF-4E14-B8AF-24841806062A}" type="slidenum">
+              <a:rPr lang="en-NL" smtClean="0"/>
+              <a:t>8</a:t>
+            </a:fld>
+            <a:endParaRPr lang="en-NL"/>
+          </a:p>
+        </p:txBody>
+      </p:sp>
+    </p:spTree>
+    <p:extLst>
+      <p:ext uri="{BB962C8B-B14F-4D97-AF65-F5344CB8AC3E}">
+        <p14:creationId xmlns:p14="http://schemas.microsoft.com/office/powerpoint/2010/main" val="2330188459"/>
+      </p:ext>
+    </p:extLst>
+  </p:cSld>
+  <p:clrMapOvr>
+    <a:masterClrMapping/>
+  </p:clrMapOvr>
+</p:notes>
+</file>
+
+<file path=ppt/notesSlides/notesSlide9.xml><?xml version="1.0" encoding="utf-8"?>
+<p:notes xmlns:a="http://schemas.openxmlformats.org/drawingml/2006/main" xmlns:r="http://schemas.openxmlformats.org/officeDocument/2006/relationships" xmlns:p="http://schemas.openxmlformats.org/presentationml/2006/main">
+  <p:cSld>
+    <p:spTree>
+      <p:nvGrpSpPr>
+        <p:cNvPr id="1" name=""/>
+        <p:cNvGrpSpPr/>
+        <p:nvPr/>
+      </p:nvGrpSpPr>
+      <p:grpSpPr>
+        <a:xfrm>
+          <a:off x="0" y="0"/>
+          <a:ext cx="0" cy="0"/>
+          <a:chOff x="0" y="0"/>
+          <a:chExt cx="0" cy="0"/>
+        </a:xfrm>
+      </p:grpSpPr>
+      <p:sp>
+        <p:nvSpPr>
+          <p:cNvPr id="2" name="Slide Image Placeholder 1"/>
+          <p:cNvSpPr>
+            <a:spLocks noGrp="1" noRot="1" noChangeAspect="1"/>
+          </p:cNvSpPr>
+          <p:nvPr>
+            <p:ph type="sldImg"/>
+          </p:nvPr>
+        </p:nvSpPr>
+        <p:spPr/>
+      </p:sp>
+      <p:sp>
+        <p:nvSpPr>
+          <p:cNvPr id="3" name="Notes Placeholder 2"/>
+          <p:cNvSpPr>
+            <a:spLocks noGrp="1"/>
+          </p:cNvSpPr>
+          <p:nvPr>
+            <p:ph type="body" idx="1"/>
+          </p:nvPr>
+        </p:nvSpPr>
+        <p:spPr/>
+        <p:txBody>
+          <a:bodyPr/>
+          <a:lstStyle/>
+          <a:p>
+            <a:endParaRPr lang="LID4096" dirty="0"/>
+          </a:p>
+        </p:txBody>
+      </p:sp>
+      <p:sp>
+        <p:nvSpPr>
+          <p:cNvPr id="4" name="Slide Number Placeholder 3"/>
+          <p:cNvSpPr>
+            <a:spLocks noGrp="1"/>
+          </p:cNvSpPr>
+          <p:nvPr>
+            <p:ph type="sldNum" sz="quarter" idx="5"/>
+          </p:nvPr>
+        </p:nvSpPr>
+        <p:spPr/>
+        <p:txBody>
+          <a:bodyPr/>
+          <a:lstStyle/>
+          <a:p>
+            <a:fld id="{413FF387-57CF-4E14-B8AF-24841806062A}" type="slidenum">
+              <a:rPr lang="en-NL" smtClean="0"/>
+              <a:t>9</a:t>
+            </a:fld>
+            <a:endParaRPr lang="en-NL"/>
+          </a:p>
+        </p:txBody>
+      </p:sp>
+    </p:spTree>
+    <p:extLst>
+      <p:ext uri="{BB962C8B-B14F-4D97-AF65-F5344CB8AC3E}">
+        <p14:creationId xmlns:p14="http://schemas.microsoft.com/office/powerpoint/2010/main" val="1161079786"/>
+      </p:ext>
+    </p:extLst>
+  </p:cSld>
+  <p:clrMapOvr>
+    <a:masterClrMapping/>
+  </p:clrMapOvr>
+</p:notes>
+</file>
+
 <file path=ppt/slideLayouts/slideLayout1.xml><?xml version="1.0" encoding="utf-8"?>
 <p:sldLayout xmlns:a="http://schemas.openxmlformats.org/drawingml/2006/main" xmlns:r="http://schemas.openxmlformats.org/officeDocument/2006/relationships" xmlns:p="http://schemas.openxmlformats.org/presentationml/2006/main" type="title" preserve="1">
   <p:cSld name="Title Slide">
@@ -1188,7 +1358,7 @@
           <a:p>
             <a:fld id="{846CE7D5-CF57-46EF-B807-FDD0502418D4}" type="datetimeFigureOut">
               <a:rPr lang="en-US" smtClean="0"/>
-              <a:t>8/10/2024</a:t>
+              <a:t>9/12/2024</a:t>
             </a:fld>
             <a:endParaRPr lang="en-US"/>
           </a:p>
@@ -1358,7 +1528,7 @@
           <a:p>
             <a:fld id="{846CE7D5-CF57-46EF-B807-FDD0502418D4}" type="datetimeFigureOut">
               <a:rPr lang="en-US" smtClean="0"/>
-              <a:t>8/10/2024</a:t>
+              <a:t>9/12/2024</a:t>
             </a:fld>
             <a:endParaRPr lang="en-US"/>
           </a:p>
@@ -1538,7 +1708,7 @@
           <a:p>
             <a:fld id="{846CE7D5-CF57-46EF-B807-FDD0502418D4}" type="datetimeFigureOut">
               <a:rPr lang="en-US" smtClean="0"/>
-              <a:t>8/10/2024</a:t>
+              <a:t>9/12/2024</a:t>
             </a:fld>
             <a:endParaRPr lang="en-US"/>
           </a:p>
@@ -3023,7 +3193,7 @@
           <a:p>
             <a:fld id="{846CE7D5-CF57-46EF-B807-FDD0502418D4}" type="datetimeFigureOut">
               <a:rPr lang="en-US" smtClean="0"/>
-              <a:t>8/10/2024</a:t>
+              <a:t>9/12/2024</a:t>
             </a:fld>
             <a:endParaRPr lang="en-US"/>
           </a:p>
@@ -4274,7 +4444,7 @@
           <a:p>
             <a:fld id="{EA730EFB-AB28-4A68-9CF2-24FEA7CF3D98}" type="datetimeFigureOut">
               <a:rPr lang="en-US" smtClean="0"/>
-              <a:t>8/10/2024</a:t>
+              <a:t>9/12/2024</a:t>
             </a:fld>
             <a:endParaRPr lang="en-US"/>
           </a:p>
@@ -4532,7 +4702,7 @@
           <a:p>
             <a:fld id="{846CE7D5-CF57-46EF-B807-FDD0502418D4}" type="datetimeFigureOut">
               <a:rPr lang="en-US" smtClean="0"/>
-              <a:t>8/10/2024</a:t>
+              <a:t>9/12/2024</a:t>
             </a:fld>
             <a:endParaRPr lang="en-US"/>
           </a:p>
@@ -4764,7 +4934,7 @@
           <a:p>
             <a:fld id="{846CE7D5-CF57-46EF-B807-FDD0502418D4}" type="datetimeFigureOut">
               <a:rPr lang="en-US" smtClean="0"/>
-              <a:t>8/10/2024</a:t>
+              <a:t>9/12/2024</a:t>
             </a:fld>
             <a:endParaRPr lang="en-US"/>
           </a:p>
@@ -5131,7 +5301,7 @@
           <a:p>
             <a:fld id="{846CE7D5-CF57-46EF-B807-FDD0502418D4}" type="datetimeFigureOut">
               <a:rPr lang="en-US" smtClean="0"/>
-              <a:t>8/10/2024</a:t>
+              <a:t>9/12/2024</a:t>
             </a:fld>
             <a:endParaRPr lang="en-US"/>
           </a:p>
@@ -5249,7 +5419,7 @@
           <a:p>
             <a:fld id="{846CE7D5-CF57-46EF-B807-FDD0502418D4}" type="datetimeFigureOut">
               <a:rPr lang="en-US" smtClean="0"/>
-              <a:t>8/10/2024</a:t>
+              <a:t>9/12/2024</a:t>
             </a:fld>
             <a:endParaRPr lang="en-US"/>
           </a:p>
@@ -5344,7 +5514,7 @@
           <a:p>
             <a:fld id="{846CE7D5-CF57-46EF-B807-FDD0502418D4}" type="datetimeFigureOut">
               <a:rPr lang="en-US" smtClean="0"/>
-              <a:t>8/10/2024</a:t>
+              <a:t>9/12/2024</a:t>
             </a:fld>
             <a:endParaRPr lang="en-US"/>
           </a:p>
@@ -5621,7 +5791,7 @@
           <a:p>
             <a:fld id="{846CE7D5-CF57-46EF-B807-FDD0502418D4}" type="datetimeFigureOut">
               <a:rPr lang="en-US" smtClean="0"/>
-              <a:t>8/10/2024</a:t>
+              <a:t>9/12/2024</a:t>
             </a:fld>
             <a:endParaRPr lang="en-US"/>
           </a:p>
@@ -5878,7 +6048,7 @@
           <a:p>
             <a:fld id="{846CE7D5-CF57-46EF-B807-FDD0502418D4}" type="datetimeFigureOut">
               <a:rPr lang="en-US" smtClean="0"/>
-              <a:t>8/10/2024</a:t>
+              <a:t>9/12/2024</a:t>
             </a:fld>
             <a:endParaRPr lang="en-US"/>
           </a:p>
@@ -6091,7 +6261,7 @@
           <a:p>
             <a:fld id="{846CE7D5-CF57-46EF-B807-FDD0502418D4}" type="datetimeFigureOut">
               <a:rPr lang="en-US" smtClean="0"/>
-              <a:t>8/10/2024</a:t>
+              <a:t>9/12/2024</a:t>
             </a:fld>
             <a:endParaRPr lang="en-US"/>
           </a:p>
@@ -7459,134 +7629,6 @@
           </a:p>
         </p:txBody>
       </p:sp>
-      <p:sp>
-        <p:nvSpPr>
-          <p:cNvPr id="12" name="TextBox 11">
-            <a:extLst>
-              <a:ext uri="{FF2B5EF4-FFF2-40B4-BE49-F238E27FC236}">
-                <a16:creationId xmlns:a16="http://schemas.microsoft.com/office/drawing/2014/main" id="{4F069AA4-0711-959B-CAE5-A3B713772B09}"/>
-              </a:ext>
-            </a:extLst>
-          </p:cNvPr>
-          <p:cNvSpPr txBox="1"/>
-          <p:nvPr/>
-        </p:nvSpPr>
-        <p:spPr>
-          <a:xfrm>
-            <a:off x="2798694" y="6235306"/>
-            <a:ext cx="5317067" cy="307777"/>
-          </a:xfrm>
-          <a:prstGeom prst="rect">
-            <a:avLst/>
-          </a:prstGeom>
-          <a:noFill/>
-        </p:spPr>
-        <p:txBody>
-          <a:bodyPr wrap="square">
-            <a:spAutoFit/>
-          </a:bodyPr>
-          <a:lstStyle/>
-          <a:p>
-            <a:r>
-              <a:rPr lang="en-US" sz="1400" b="0" i="0" dirty="0">
-                <a:effectLst/>
-                <a:highlight>
-                  <a:srgbClr val="F8F9F9"/>
-                </a:highlight>
-                <a:latin typeface="Mulish"/>
-              </a:rPr>
-              <a:t>Case courtesy of Ian </a:t>
-            </a:r>
-            <a:r>
-              <a:rPr lang="en-US" sz="1400" b="0" i="0" dirty="0" err="1">
-                <a:effectLst/>
-                <a:highlight>
-                  <a:srgbClr val="F8F9F9"/>
-                </a:highlight>
-                <a:latin typeface="Mulish"/>
-              </a:rPr>
-              <a:t>Bickle</a:t>
-            </a:r>
-            <a:r>
-              <a:rPr lang="en-US" sz="1400" b="0" i="0" dirty="0">
-                <a:effectLst/>
-                <a:highlight>
-                  <a:srgbClr val="F8F9F9"/>
-                </a:highlight>
-                <a:latin typeface="Mulish"/>
-              </a:rPr>
-              <a:t>, </a:t>
-            </a:r>
-            <a:r>
-              <a:rPr lang="en-US" sz="1400" b="0" i="0" u="none" strike="noStrike" dirty="0">
-                <a:effectLst/>
-                <a:latin typeface="Mulish"/>
-                <a:hlinkClick r:id="rId3">
-                  <a:extLst>
-                    <a:ext uri="{A12FA001-AC4F-418D-AE19-62706E023703}">
-                      <ahyp:hlinkClr xmlns:ahyp="http://schemas.microsoft.com/office/drawing/2018/hyperlinkcolor" val="tx"/>
-                    </a:ext>
-                  </a:extLst>
-                </a:hlinkClick>
-              </a:rPr>
-              <a:t>Radiopaedia.org</a:t>
-            </a:r>
-            <a:r>
-              <a:rPr lang="en-US" sz="1400" b="0" i="0" dirty="0">
-                <a:effectLst/>
-                <a:highlight>
-                  <a:srgbClr val="F8F9F9"/>
-                </a:highlight>
-                <a:latin typeface="Mulish"/>
-              </a:rPr>
-              <a:t>. From the case </a:t>
-            </a:r>
-            <a:r>
-              <a:rPr lang="en-US" sz="1400" b="0" i="0" u="none" strike="noStrike" dirty="0" err="1">
-                <a:effectLst/>
-                <a:latin typeface="Mulish"/>
-                <a:hlinkClick r:id="rId4">
-                  <a:extLst>
-                    <a:ext uri="{A12FA001-AC4F-418D-AE19-62706E023703}">
-                      <ahyp:hlinkClr xmlns:ahyp="http://schemas.microsoft.com/office/drawing/2018/hyperlinkcolor" val="tx"/>
-                    </a:ext>
-                  </a:extLst>
-                </a:hlinkClick>
-              </a:rPr>
-              <a:t>r</a:t>
-            </a:r>
-            <a:r>
-              <a:rPr lang="en-US" sz="1400" b="0" i="0" u="none" strike="noStrike" dirty="0" err="1">
-                <a:effectLst/>
-                <a:latin typeface="Mulish"/>
-                <a:hlinkClick r:id="rId4">
-                  <a:extLst>
-                    <a:ext uri="{A12FA001-AC4F-418D-AE19-62706E023703}">
-                      <ahyp:hlinkClr xmlns:ahyp="http://schemas.microsoft.com/office/drawing/2018/hyperlinkcolor" val="tx"/>
-                    </a:ext>
-                  </a:extLst>
-                </a:hlinkClick>
-              </a:rPr>
-              <a:t>ID</a:t>
-            </a:r>
-            <a:r>
-              <a:rPr lang="en-US" sz="1400" b="0" i="0" u="none" strike="noStrike" dirty="0">
-                <a:effectLst/>
-                <a:latin typeface="Mulish"/>
-                <a:hlinkClick r:id="rId4">
-                  <a:extLst>
-                    <a:ext uri="{A12FA001-AC4F-418D-AE19-62706E023703}">
-                      <ahyp:hlinkClr xmlns:ahyp="http://schemas.microsoft.com/office/drawing/2018/hyperlinkcolor" val="tx"/>
-                    </a:ext>
-                  </a:extLst>
-                </a:hlinkClick>
-              </a:rPr>
-              <a:t>: 61830</a:t>
-            </a:r>
-            <a:endParaRPr lang="LID4096" sz="1400" dirty="0"/>
-          </a:p>
-        </p:txBody>
-      </p:sp>
       <p:pic>
         <p:nvPicPr>
           <p:cNvPr id="5" name="Graphic 4" descr="Heart lock outline">
@@ -7602,10 +7644,10 @@
           <p:nvPr/>
         </p:nvPicPr>
         <p:blipFill>
-          <a:blip r:embed="rId5">
+          <a:blip r:embed="rId3">
             <a:extLst>
               <a:ext uri="{96DAC541-7B7A-43D3-8B79-37D633B846F1}">
-                <asvg:svgBlip xmlns:asvg="http://schemas.microsoft.com/office/drawing/2016/SVG/main" r:embed="rId6"/>
+                <asvg:svgBlip xmlns:asvg="http://schemas.microsoft.com/office/drawing/2016/SVG/main" r:embed="rId4"/>
               </a:ext>
             </a:extLst>
           </a:blip>
@@ -7638,10 +7680,10 @@
           <p:nvPr/>
         </p:nvPicPr>
         <p:blipFill>
-          <a:blip r:embed="rId7">
+          <a:blip r:embed="rId5">
             <a:extLst>
               <a:ext uri="{96DAC541-7B7A-43D3-8B79-37D633B846F1}">
-                <asvg:svgBlip xmlns:asvg="http://schemas.microsoft.com/office/drawing/2016/SVG/main" r:embed="rId8"/>
+                <asvg:svgBlip xmlns:asvg="http://schemas.microsoft.com/office/drawing/2016/SVG/main" r:embed="rId6"/>
               </a:ext>
             </a:extLst>
           </a:blip>
@@ -7674,10 +7716,10 @@
           <p:nvPr/>
         </p:nvPicPr>
         <p:blipFill>
-          <a:blip r:embed="rId9">
+          <a:blip r:embed="rId7">
             <a:extLst>
               <a:ext uri="{96DAC541-7B7A-43D3-8B79-37D633B846F1}">
-                <asvg:svgBlip xmlns:asvg="http://schemas.microsoft.com/office/drawing/2016/SVG/main" r:embed="rId10"/>
+                <asvg:svgBlip xmlns:asvg="http://schemas.microsoft.com/office/drawing/2016/SVG/main" r:embed="rId8"/>
               </a:ext>
             </a:extLst>
           </a:blip>
@@ -7710,10 +7752,10 @@
           <p:nvPr/>
         </p:nvPicPr>
         <p:blipFill>
-          <a:blip r:embed="rId11">
+          <a:blip r:embed="rId9">
             <a:extLst>
               <a:ext uri="{96DAC541-7B7A-43D3-8B79-37D633B846F1}">
-                <asvg:svgBlip xmlns:asvg="http://schemas.microsoft.com/office/drawing/2016/SVG/main" r:embed="rId12"/>
+                <asvg:svgBlip xmlns:asvg="http://schemas.microsoft.com/office/drawing/2016/SVG/main" r:embed="rId10"/>
               </a:ext>
             </a:extLst>
           </a:blip>
@@ -10142,21 +10184,7 @@
                   </a:extLst>
                 </a:hlinkClick>
               </a:rPr>
-              <a:t>r</a:t>
-            </a:r>
-            <a:r>
-              <a:rPr lang="en-US" sz="1400" b="0" i="0" u="none" strike="noStrike" dirty="0" err="1">
-                <a:effectLst/>
-                <a:latin typeface="Mulish"/>
-                <a:hlinkClick r:id="rId5">
-                  <a:extLst>
-                    <a:ext uri="{A12FA001-AC4F-418D-AE19-62706E023703}">
-                      <ahyp:hlinkClr xmlns:ahyp="http://schemas.microsoft.com/office/drawing/2018/hyperlinkcolor" val="tx"/>
-                    </a:ext>
-                  </a:extLst>
-                </a:hlinkClick>
-              </a:rPr>
-              <a:t>ID</a:t>
+              <a:t>rID</a:t>
             </a:r>
             <a:r>
               <a:rPr lang="en-US" sz="1400" b="0" i="0" u="none" strike="noStrike" dirty="0">
@@ -10803,6 +10831,1100 @@
     <p:extLst>
       <p:ext uri="{BB962C8B-B14F-4D97-AF65-F5344CB8AC3E}">
         <p14:creationId xmlns:p14="http://schemas.microsoft.com/office/powerpoint/2010/main" val="3197329382"/>
+      </p:ext>
+    </p:extLst>
+  </p:cSld>
+  <p:clrMapOvr>
+    <a:masterClrMapping/>
+  </p:clrMapOvr>
+  <p:timing>
+    <p:tnLst>
+      <p:par>
+        <p:cTn id="1" dur="indefinite" restart="never" nodeType="tmRoot">
+          <p:childTnLst>
+            <p:seq concurrent="1" nextAc="seek">
+              <p:cTn id="2" dur="indefinite" nodeType="mainSeq">
+                <p:childTnLst>
+                  <p:par>
+                    <p:cTn id="3" fill="hold">
+                      <p:stCondLst>
+                        <p:cond delay="indefinite"/>
+                      </p:stCondLst>
+                      <p:childTnLst>
+                        <p:par>
+                          <p:cTn id="4" fill="hold">
+                            <p:stCondLst>
+                              <p:cond delay="0"/>
+                            </p:stCondLst>
+                            <p:childTnLst>
+                              <p:par>
+                                <p:cTn id="5" presetID="1" presetClass="entr" presetSubtype="0" fill="hold" grpId="0" nodeType="clickEffect" nodePh="1">
+                                  <p:stCondLst>
+                                    <p:cond delay="0"/>
+                                  </p:stCondLst>
+                                  <p:endCondLst>
+                                    <p:cond evt="begin" delay="0">
+                                      <p:tn val="5"/>
+                                    </p:cond>
+                                  </p:endCondLst>
+                                  <p:childTnLst>
+                                    <p:set>
+                                      <p:cBhvr>
+                                        <p:cTn id="6" dur="1" fill="hold">
+                                          <p:stCondLst>
+                                            <p:cond delay="0"/>
+                                          </p:stCondLst>
+                                        </p:cTn>
+                                        <p:tgtEl>
+                                          <p:spTgt spid="6"/>
+                                        </p:tgtEl>
+                                        <p:attrNameLst>
+                                          <p:attrName>style.visibility</p:attrName>
+                                        </p:attrNameLst>
+                                      </p:cBhvr>
+                                      <p:to>
+                                        <p:strVal val="visible"/>
+                                      </p:to>
+                                    </p:set>
+                                  </p:childTnLst>
+                                </p:cTn>
+                              </p:par>
+                            </p:childTnLst>
+                          </p:cTn>
+                        </p:par>
+                      </p:childTnLst>
+                    </p:cTn>
+                  </p:par>
+                </p:childTnLst>
+              </p:cTn>
+              <p:prevCondLst>
+                <p:cond evt="onPrev" delay="0">
+                  <p:tgtEl>
+                    <p:sldTgt/>
+                  </p:tgtEl>
+                </p:cond>
+              </p:prevCondLst>
+              <p:nextCondLst>
+                <p:cond evt="onNext" delay="0">
+                  <p:tgtEl>
+                    <p:sldTgt/>
+                  </p:tgtEl>
+                </p:cond>
+              </p:nextCondLst>
+            </p:seq>
+          </p:childTnLst>
+        </p:cTn>
+      </p:par>
+    </p:tnLst>
+    <p:bldLst>
+      <p:bldP spid="6" grpId="0"/>
+    </p:bldLst>
+  </p:timing>
+</p:sld>
+</file>
+
+<file path=ppt/slides/slide8.xml><?xml version="1.0" encoding="utf-8"?>
+<p:sld xmlns:a="http://schemas.openxmlformats.org/drawingml/2006/main" xmlns:r="http://schemas.openxmlformats.org/officeDocument/2006/relationships" xmlns:p="http://schemas.openxmlformats.org/presentationml/2006/main">
+  <p:cSld>
+    <p:spTree>
+      <p:nvGrpSpPr>
+        <p:cNvPr id="1" name=""/>
+        <p:cNvGrpSpPr/>
+        <p:nvPr/>
+      </p:nvGrpSpPr>
+      <p:grpSpPr>
+        <a:xfrm>
+          <a:off x="0" y="0"/>
+          <a:ext cx="0" cy="0"/>
+          <a:chOff x="0" y="0"/>
+          <a:chExt cx="0" cy="0"/>
+        </a:xfrm>
+      </p:grpSpPr>
+      <p:sp>
+        <p:nvSpPr>
+          <p:cNvPr id="3" name="TextBox 1">
+            <a:extLst>
+              <a:ext uri="{FF2B5EF4-FFF2-40B4-BE49-F238E27FC236}">
+                <a16:creationId xmlns:a16="http://schemas.microsoft.com/office/drawing/2014/main" id="{B76E810A-7D89-CFF6-389E-860870EE3033}"/>
+              </a:ext>
+            </a:extLst>
+          </p:cNvPr>
+          <p:cNvSpPr txBox="1"/>
+          <p:nvPr/>
+        </p:nvSpPr>
+        <p:spPr>
+          <a:xfrm>
+            <a:off x="1299411" y="1836821"/>
+            <a:ext cx="9420976" cy="1200329"/>
+          </a:xfrm>
+          <a:prstGeom prst="rect">
+            <a:avLst/>
+          </a:prstGeom>
+          <a:noFill/>
+        </p:spPr>
+        <p:txBody>
+          <a:bodyPr wrap="square" lIns="91440" tIns="45720" rIns="91440" bIns="45720" rtlCol="0" anchor="t">
+            <a:spAutoFit/>
+          </a:bodyPr>
+          <a:lstStyle>
+            <a:defPPr>
+              <a:defRPr lang="en-US"/>
+            </a:defPPr>
+            <a:lvl1pPr marL="0" algn="l" defTabSz="914400" rtl="0" eaLnBrk="1" latinLnBrk="0" hangingPunct="1">
+              <a:defRPr sz="1800" kern="1200">
+                <a:solidFill>
+                  <a:schemeClr val="tx1"/>
+                </a:solidFill>
+                <a:latin typeface="+mn-lt"/>
+                <a:ea typeface="+mn-ea"/>
+                <a:cs typeface="+mn-cs"/>
+              </a:defRPr>
+            </a:lvl1pPr>
+            <a:lvl2pPr marL="457200" algn="l" defTabSz="914400" rtl="0" eaLnBrk="1" latinLnBrk="0" hangingPunct="1">
+              <a:defRPr sz="1800" kern="1200">
+                <a:solidFill>
+                  <a:schemeClr val="tx1"/>
+                </a:solidFill>
+                <a:latin typeface="+mn-lt"/>
+                <a:ea typeface="+mn-ea"/>
+                <a:cs typeface="+mn-cs"/>
+              </a:defRPr>
+            </a:lvl2pPr>
+            <a:lvl3pPr marL="914400" algn="l" defTabSz="914400" rtl="0" eaLnBrk="1" latinLnBrk="0" hangingPunct="1">
+              <a:defRPr sz="1800" kern="1200">
+                <a:solidFill>
+                  <a:schemeClr val="tx1"/>
+                </a:solidFill>
+                <a:latin typeface="+mn-lt"/>
+                <a:ea typeface="+mn-ea"/>
+                <a:cs typeface="+mn-cs"/>
+              </a:defRPr>
+            </a:lvl3pPr>
+            <a:lvl4pPr marL="1371600" algn="l" defTabSz="914400" rtl="0" eaLnBrk="1" latinLnBrk="0" hangingPunct="1">
+              <a:defRPr sz="1800" kern="1200">
+                <a:solidFill>
+                  <a:schemeClr val="tx1"/>
+                </a:solidFill>
+                <a:latin typeface="+mn-lt"/>
+                <a:ea typeface="+mn-ea"/>
+                <a:cs typeface="+mn-cs"/>
+              </a:defRPr>
+            </a:lvl4pPr>
+            <a:lvl5pPr marL="1828800" algn="l" defTabSz="914400" rtl="0" eaLnBrk="1" latinLnBrk="0" hangingPunct="1">
+              <a:defRPr sz="1800" kern="1200">
+                <a:solidFill>
+                  <a:schemeClr val="tx1"/>
+                </a:solidFill>
+                <a:latin typeface="+mn-lt"/>
+                <a:ea typeface="+mn-ea"/>
+                <a:cs typeface="+mn-cs"/>
+              </a:defRPr>
+            </a:lvl5pPr>
+            <a:lvl6pPr marL="2286000" algn="l" defTabSz="914400" rtl="0" eaLnBrk="1" latinLnBrk="0" hangingPunct="1">
+              <a:defRPr sz="1800" kern="1200">
+                <a:solidFill>
+                  <a:schemeClr val="tx1"/>
+                </a:solidFill>
+                <a:latin typeface="+mn-lt"/>
+                <a:ea typeface="+mn-ea"/>
+                <a:cs typeface="+mn-cs"/>
+              </a:defRPr>
+            </a:lvl6pPr>
+            <a:lvl7pPr marL="2743200" algn="l" defTabSz="914400" rtl="0" eaLnBrk="1" latinLnBrk="0" hangingPunct="1">
+              <a:defRPr sz="1800" kern="1200">
+                <a:solidFill>
+                  <a:schemeClr val="tx1"/>
+                </a:solidFill>
+                <a:latin typeface="+mn-lt"/>
+                <a:ea typeface="+mn-ea"/>
+                <a:cs typeface="+mn-cs"/>
+              </a:defRPr>
+            </a:lvl7pPr>
+            <a:lvl8pPr marL="3200400" algn="l" defTabSz="914400" rtl="0" eaLnBrk="1" latinLnBrk="0" hangingPunct="1">
+              <a:defRPr sz="1800" kern="1200">
+                <a:solidFill>
+                  <a:schemeClr val="tx1"/>
+                </a:solidFill>
+                <a:latin typeface="+mn-lt"/>
+                <a:ea typeface="+mn-ea"/>
+                <a:cs typeface="+mn-cs"/>
+              </a:defRPr>
+            </a:lvl8pPr>
+            <a:lvl9pPr marL="3657600" algn="l" defTabSz="914400" rtl="0" eaLnBrk="1" latinLnBrk="0" hangingPunct="1">
+              <a:defRPr sz="1800" kern="1200">
+                <a:solidFill>
+                  <a:schemeClr val="tx1"/>
+                </a:solidFill>
+                <a:latin typeface="+mn-lt"/>
+                <a:ea typeface="+mn-ea"/>
+                <a:cs typeface="+mn-cs"/>
+              </a:defRPr>
+            </a:lvl9pPr>
+          </a:lstStyle>
+          <a:p>
+            <a:endParaRPr lang="en-US" sz="2400" b="1">
+              <a:solidFill>
+                <a:srgbClr val="7030A0"/>
+              </a:solidFill>
+              <a:latin typeface="Assistant" pitchFamily="2" charset="-79"/>
+              <a:cs typeface="Assistant" pitchFamily="2" charset="-79"/>
+            </a:endParaRPr>
+          </a:p>
+          <a:p>
+            <a:endParaRPr lang="en-US" sz="2400" b="1">
+              <a:solidFill>
+                <a:srgbClr val="7030A0"/>
+              </a:solidFill>
+              <a:latin typeface="Assistant" pitchFamily="2" charset="-79"/>
+              <a:cs typeface="Assistant" pitchFamily="2" charset="-79"/>
+            </a:endParaRPr>
+          </a:p>
+          <a:p>
+            <a:r>
+              <a:rPr lang="en-US" sz="2400" b="1">
+                <a:solidFill>
+                  <a:srgbClr val="00A0E1"/>
+                </a:solidFill>
+                <a:latin typeface="Assistant" pitchFamily="2" charset="-79"/>
+                <a:cs typeface="Assistant" pitchFamily="2" charset="-79"/>
+              </a:rPr>
+              <a:t>   </a:t>
+            </a:r>
+            <a:endParaRPr lang="en-US" sz="2400" b="1" dirty="0">
+              <a:solidFill>
+                <a:srgbClr val="00A0E1"/>
+              </a:solidFill>
+              <a:latin typeface="Assistant" pitchFamily="2" charset="-79"/>
+              <a:cs typeface="Assistant" pitchFamily="2" charset="-79"/>
+            </a:endParaRPr>
+          </a:p>
+        </p:txBody>
+      </p:sp>
+      <p:sp>
+        <p:nvSpPr>
+          <p:cNvPr id="6" name="TextBox 5">
+            <a:extLst>
+              <a:ext uri="{FF2B5EF4-FFF2-40B4-BE49-F238E27FC236}">
+                <a16:creationId xmlns:a16="http://schemas.microsoft.com/office/drawing/2014/main" id="{06A4B648-05BE-03EB-D1AD-5BD4B922EF2D}"/>
+              </a:ext>
+            </a:extLst>
+          </p:cNvPr>
+          <p:cNvSpPr txBox="1"/>
+          <p:nvPr/>
+        </p:nvSpPr>
+        <p:spPr>
+          <a:xfrm>
+            <a:off x="1518047" y="4929187"/>
+            <a:ext cx="7878363" cy="461665"/>
+          </a:xfrm>
+          <a:prstGeom prst="rect">
+            <a:avLst/>
+          </a:prstGeom>
+          <a:noFill/>
+        </p:spPr>
+        <p:txBody>
+          <a:bodyPr rot="0" spcFirstLastPara="0" vertOverflow="overflow" horzOverflow="overflow" vert="horz" wrap="square" lIns="91440" tIns="45720" rIns="91440" bIns="45720" numCol="1" spcCol="0" rtlCol="0" fromWordArt="0" anchor="t" anchorCtr="0" forceAA="0" compatLnSpc="1">
+            <a:prstTxWarp prst="textNoShape">
+              <a:avLst/>
+            </a:prstTxWarp>
+            <a:spAutoFit/>
+          </a:bodyPr>
+          <a:lstStyle/>
+          <a:p>
+            <a:pPr rtl="0"/>
+            <a:endParaRPr lang="en-US" sz="2400">
+              <a:cs typeface="Segoe UI"/>
+            </a:endParaRPr>
+          </a:p>
+        </p:txBody>
+      </p:sp>
+      <p:sp>
+        <p:nvSpPr>
+          <p:cNvPr id="2" name="Title 6">
+            <a:extLst>
+              <a:ext uri="{FF2B5EF4-FFF2-40B4-BE49-F238E27FC236}">
+                <a16:creationId xmlns:a16="http://schemas.microsoft.com/office/drawing/2014/main" id="{223292A2-BB5C-E829-4FE8-6EED9FD4CBBD}"/>
+              </a:ext>
+            </a:extLst>
+          </p:cNvPr>
+          <p:cNvSpPr>
+            <a:spLocks noGrp="1"/>
+          </p:cNvSpPr>
+          <p:nvPr>
+            <p:ph type="title"/>
+          </p:nvPr>
+        </p:nvSpPr>
+        <p:spPr>
+          <a:xfrm>
+            <a:off x="1029731" y="177348"/>
+            <a:ext cx="9036908" cy="654674"/>
+          </a:xfrm>
+        </p:spPr>
+        <p:txBody>
+          <a:bodyPr/>
+          <a:lstStyle/>
+          <a:p>
+            <a:pPr algn="ctr"/>
+            <a:r>
+              <a:rPr lang="en-US" b="1" dirty="0">
+                <a:solidFill>
+                  <a:srgbClr val="000000"/>
+                </a:solidFill>
+                <a:latin typeface="Assistant" pitchFamily="2" charset="-79"/>
+                <a:ea typeface="+mj-lt"/>
+                <a:cs typeface="Assistant" pitchFamily="2" charset="-79"/>
+              </a:rPr>
+              <a:t> Image anonymization </a:t>
+            </a:r>
+            <a:endParaRPr lang="en-NL" dirty="0"/>
+          </a:p>
+        </p:txBody>
+      </p:sp>
+      <p:sp>
+        <p:nvSpPr>
+          <p:cNvPr id="13" name="TextBox 12">
+            <a:extLst>
+              <a:ext uri="{FF2B5EF4-FFF2-40B4-BE49-F238E27FC236}">
+                <a16:creationId xmlns:a16="http://schemas.microsoft.com/office/drawing/2014/main" id="{E65974A0-21C0-2F1D-D9BF-1419456DDDCF}"/>
+              </a:ext>
+            </a:extLst>
+          </p:cNvPr>
+          <p:cNvSpPr txBox="1"/>
+          <p:nvPr/>
+        </p:nvSpPr>
+        <p:spPr>
+          <a:xfrm>
+            <a:off x="6023729" y="1836821"/>
+            <a:ext cx="5137607" cy="954107"/>
+          </a:xfrm>
+          <a:prstGeom prst="rect">
+            <a:avLst/>
+          </a:prstGeom>
+          <a:noFill/>
+        </p:spPr>
+        <p:txBody>
+          <a:bodyPr wrap="square" rtlCol="0">
+            <a:spAutoFit/>
+          </a:bodyPr>
+          <a:lstStyle/>
+          <a:p>
+            <a:endParaRPr lang="en-US" sz="2800" b="1">
+              <a:solidFill>
+                <a:srgbClr val="3E1B59"/>
+              </a:solidFill>
+              <a:latin typeface="Assistant" pitchFamily="2" charset="-79"/>
+              <a:cs typeface="Assistant" pitchFamily="2" charset="-79"/>
+            </a:endParaRPr>
+          </a:p>
+          <a:p>
+            <a:endParaRPr lang="LID4096" sz="2800" dirty="0"/>
+          </a:p>
+        </p:txBody>
+      </p:sp>
+      <p:sp>
+        <p:nvSpPr>
+          <p:cNvPr id="12" name="TextBox 11">
+            <a:extLst>
+              <a:ext uri="{FF2B5EF4-FFF2-40B4-BE49-F238E27FC236}">
+                <a16:creationId xmlns:a16="http://schemas.microsoft.com/office/drawing/2014/main" id="{4F069AA4-0711-959B-CAE5-A3B713772B09}"/>
+              </a:ext>
+            </a:extLst>
+          </p:cNvPr>
+          <p:cNvSpPr txBox="1"/>
+          <p:nvPr/>
+        </p:nvSpPr>
+        <p:spPr>
+          <a:xfrm>
+            <a:off x="939800" y="1092200"/>
+            <a:ext cx="10659534" cy="1077218"/>
+          </a:xfrm>
+          <a:prstGeom prst="rect">
+            <a:avLst/>
+          </a:prstGeom>
+          <a:noFill/>
+        </p:spPr>
+        <p:txBody>
+          <a:bodyPr wrap="square">
+            <a:spAutoFit/>
+          </a:bodyPr>
+          <a:lstStyle/>
+          <a:p>
+            <a:pPr algn="ctr"/>
+            <a:r>
+              <a:rPr lang="en-US" sz="4000" dirty="0">
+                <a:solidFill>
+                  <a:srgbClr val="383838"/>
+                </a:solidFill>
+                <a:highlight>
+                  <a:srgbClr val="FFFFFF"/>
+                </a:highlight>
+                <a:latin typeface="Mulish"/>
+              </a:rPr>
+              <a:t>Let’s get coding</a:t>
+            </a:r>
+            <a:endParaRPr lang="en-US" sz="4000" b="0" i="0" dirty="0">
+              <a:solidFill>
+                <a:srgbClr val="383838"/>
+              </a:solidFill>
+              <a:effectLst/>
+              <a:highlight>
+                <a:srgbClr val="FFFFFF"/>
+              </a:highlight>
+              <a:latin typeface="Mulish"/>
+            </a:endParaRPr>
+          </a:p>
+          <a:p>
+            <a:pPr algn="ctr"/>
+            <a:endParaRPr lang="en-US" sz="2400" b="0" i="0" u="none" strike="noStrike" dirty="0">
+              <a:solidFill>
+                <a:srgbClr val="00B050"/>
+              </a:solidFill>
+              <a:effectLst/>
+              <a:highlight>
+                <a:srgbClr val="FFFFFF"/>
+              </a:highlight>
+              <a:latin typeface="Arial" panose="020B0604020202020204" pitchFamily="34" charset="0"/>
+            </a:endParaRPr>
+          </a:p>
+        </p:txBody>
+      </p:sp>
+      <p:sp>
+        <p:nvSpPr>
+          <p:cNvPr id="8" name="TextBox 7">
+            <a:extLst>
+              <a:ext uri="{FF2B5EF4-FFF2-40B4-BE49-F238E27FC236}">
+                <a16:creationId xmlns:a16="http://schemas.microsoft.com/office/drawing/2014/main" id="{4ED5200B-9061-FF5E-1DA1-A9102E988D11}"/>
+              </a:ext>
+            </a:extLst>
+          </p:cNvPr>
+          <p:cNvSpPr txBox="1"/>
+          <p:nvPr/>
+        </p:nvSpPr>
+        <p:spPr>
+          <a:xfrm>
+            <a:off x="2899954" y="6126654"/>
+            <a:ext cx="5852160" cy="246221"/>
+          </a:xfrm>
+          <a:prstGeom prst="rect">
+            <a:avLst/>
+          </a:prstGeom>
+          <a:noFill/>
+        </p:spPr>
+        <p:txBody>
+          <a:bodyPr wrap="square" rtlCol="0">
+            <a:spAutoFit/>
+          </a:bodyPr>
+          <a:lstStyle/>
+          <a:p>
+            <a:endParaRPr lang="LID4096" sz="1000" dirty="0"/>
+          </a:p>
+        </p:txBody>
+      </p:sp>
+      <p:pic>
+        <p:nvPicPr>
+          <p:cNvPr id="5" name="Picture 4">
+            <a:extLst>
+              <a:ext uri="{FF2B5EF4-FFF2-40B4-BE49-F238E27FC236}">
+                <a16:creationId xmlns:a16="http://schemas.microsoft.com/office/drawing/2014/main" id="{CBEA84C9-27EF-13CE-FDB9-8B3C316B13FD}"/>
+              </a:ext>
+            </a:extLst>
+          </p:cNvPr>
+          <p:cNvPicPr>
+            <a:picLocks noChangeAspect="1"/>
+          </p:cNvPicPr>
+          <p:nvPr/>
+        </p:nvPicPr>
+        <p:blipFill>
+          <a:blip r:embed="rId3"/>
+          <a:stretch>
+            <a:fillRect/>
+          </a:stretch>
+        </p:blipFill>
+        <p:spPr>
+          <a:xfrm>
+            <a:off x="1437625" y="1961945"/>
+            <a:ext cx="9316750" cy="2934109"/>
+          </a:xfrm>
+          <a:prstGeom prst="rect">
+            <a:avLst/>
+          </a:prstGeom>
+        </p:spPr>
+      </p:pic>
+    </p:spTree>
+    <p:extLst>
+      <p:ext uri="{BB962C8B-B14F-4D97-AF65-F5344CB8AC3E}">
+        <p14:creationId xmlns:p14="http://schemas.microsoft.com/office/powerpoint/2010/main" val="188079368"/>
+      </p:ext>
+    </p:extLst>
+  </p:cSld>
+  <p:clrMapOvr>
+    <a:masterClrMapping/>
+  </p:clrMapOvr>
+  <p:timing>
+    <p:tnLst>
+      <p:par>
+        <p:cTn id="1" dur="indefinite" restart="never" nodeType="tmRoot">
+          <p:childTnLst>
+            <p:seq concurrent="1" nextAc="seek">
+              <p:cTn id="2" dur="indefinite" nodeType="mainSeq">
+                <p:childTnLst>
+                  <p:par>
+                    <p:cTn id="3" fill="hold">
+                      <p:stCondLst>
+                        <p:cond delay="indefinite"/>
+                      </p:stCondLst>
+                      <p:childTnLst>
+                        <p:par>
+                          <p:cTn id="4" fill="hold">
+                            <p:stCondLst>
+                              <p:cond delay="0"/>
+                            </p:stCondLst>
+                            <p:childTnLst>
+                              <p:par>
+                                <p:cTn id="5" presetID="1" presetClass="entr" presetSubtype="0" fill="hold" grpId="0" nodeType="clickEffect" nodePh="1">
+                                  <p:stCondLst>
+                                    <p:cond delay="0"/>
+                                  </p:stCondLst>
+                                  <p:endCondLst>
+                                    <p:cond evt="begin" delay="0">
+                                      <p:tn val="5"/>
+                                    </p:cond>
+                                  </p:endCondLst>
+                                  <p:childTnLst>
+                                    <p:set>
+                                      <p:cBhvr>
+                                        <p:cTn id="6" dur="1" fill="hold">
+                                          <p:stCondLst>
+                                            <p:cond delay="0"/>
+                                          </p:stCondLst>
+                                        </p:cTn>
+                                        <p:tgtEl>
+                                          <p:spTgt spid="6"/>
+                                        </p:tgtEl>
+                                        <p:attrNameLst>
+                                          <p:attrName>style.visibility</p:attrName>
+                                        </p:attrNameLst>
+                                      </p:cBhvr>
+                                      <p:to>
+                                        <p:strVal val="visible"/>
+                                      </p:to>
+                                    </p:set>
+                                  </p:childTnLst>
+                                </p:cTn>
+                              </p:par>
+                            </p:childTnLst>
+                          </p:cTn>
+                        </p:par>
+                      </p:childTnLst>
+                    </p:cTn>
+                  </p:par>
+                </p:childTnLst>
+              </p:cTn>
+              <p:prevCondLst>
+                <p:cond evt="onPrev" delay="0">
+                  <p:tgtEl>
+                    <p:sldTgt/>
+                  </p:tgtEl>
+                </p:cond>
+              </p:prevCondLst>
+              <p:nextCondLst>
+                <p:cond evt="onNext" delay="0">
+                  <p:tgtEl>
+                    <p:sldTgt/>
+                  </p:tgtEl>
+                </p:cond>
+              </p:nextCondLst>
+            </p:seq>
+          </p:childTnLst>
+        </p:cTn>
+      </p:par>
+    </p:tnLst>
+    <p:bldLst>
+      <p:bldP spid="6" grpId="0"/>
+    </p:bldLst>
+  </p:timing>
+</p:sld>
+</file>
+
+<file path=ppt/slides/slide9.xml><?xml version="1.0" encoding="utf-8"?>
+<p:sld xmlns:a="http://schemas.openxmlformats.org/drawingml/2006/main" xmlns:r="http://schemas.openxmlformats.org/officeDocument/2006/relationships" xmlns:p="http://schemas.openxmlformats.org/presentationml/2006/main">
+  <p:cSld>
+    <p:spTree>
+      <p:nvGrpSpPr>
+        <p:cNvPr id="1" name=""/>
+        <p:cNvGrpSpPr/>
+        <p:nvPr/>
+      </p:nvGrpSpPr>
+      <p:grpSpPr>
+        <a:xfrm>
+          <a:off x="0" y="0"/>
+          <a:ext cx="0" cy="0"/>
+          <a:chOff x="0" y="0"/>
+          <a:chExt cx="0" cy="0"/>
+        </a:xfrm>
+      </p:grpSpPr>
+      <p:sp>
+        <p:nvSpPr>
+          <p:cNvPr id="3" name="TextBox 1">
+            <a:extLst>
+              <a:ext uri="{FF2B5EF4-FFF2-40B4-BE49-F238E27FC236}">
+                <a16:creationId xmlns:a16="http://schemas.microsoft.com/office/drawing/2014/main" id="{B76E810A-7D89-CFF6-389E-860870EE3033}"/>
+              </a:ext>
+            </a:extLst>
+          </p:cNvPr>
+          <p:cNvSpPr txBox="1"/>
+          <p:nvPr/>
+        </p:nvSpPr>
+        <p:spPr>
+          <a:xfrm>
+            <a:off x="1299411" y="1836821"/>
+            <a:ext cx="9420976" cy="1200329"/>
+          </a:xfrm>
+          <a:prstGeom prst="rect">
+            <a:avLst/>
+          </a:prstGeom>
+          <a:noFill/>
+        </p:spPr>
+        <p:txBody>
+          <a:bodyPr wrap="square" lIns="91440" tIns="45720" rIns="91440" bIns="45720" rtlCol="0" anchor="t">
+            <a:spAutoFit/>
+          </a:bodyPr>
+          <a:lstStyle>
+            <a:defPPr>
+              <a:defRPr lang="en-US"/>
+            </a:defPPr>
+            <a:lvl1pPr marL="0" algn="l" defTabSz="914400" rtl="0" eaLnBrk="1" latinLnBrk="0" hangingPunct="1">
+              <a:defRPr sz="1800" kern="1200">
+                <a:solidFill>
+                  <a:schemeClr val="tx1"/>
+                </a:solidFill>
+                <a:latin typeface="+mn-lt"/>
+                <a:ea typeface="+mn-ea"/>
+                <a:cs typeface="+mn-cs"/>
+              </a:defRPr>
+            </a:lvl1pPr>
+            <a:lvl2pPr marL="457200" algn="l" defTabSz="914400" rtl="0" eaLnBrk="1" latinLnBrk="0" hangingPunct="1">
+              <a:defRPr sz="1800" kern="1200">
+                <a:solidFill>
+                  <a:schemeClr val="tx1"/>
+                </a:solidFill>
+                <a:latin typeface="+mn-lt"/>
+                <a:ea typeface="+mn-ea"/>
+                <a:cs typeface="+mn-cs"/>
+              </a:defRPr>
+            </a:lvl2pPr>
+            <a:lvl3pPr marL="914400" algn="l" defTabSz="914400" rtl="0" eaLnBrk="1" latinLnBrk="0" hangingPunct="1">
+              <a:defRPr sz="1800" kern="1200">
+                <a:solidFill>
+                  <a:schemeClr val="tx1"/>
+                </a:solidFill>
+                <a:latin typeface="+mn-lt"/>
+                <a:ea typeface="+mn-ea"/>
+                <a:cs typeface="+mn-cs"/>
+              </a:defRPr>
+            </a:lvl3pPr>
+            <a:lvl4pPr marL="1371600" algn="l" defTabSz="914400" rtl="0" eaLnBrk="1" latinLnBrk="0" hangingPunct="1">
+              <a:defRPr sz="1800" kern="1200">
+                <a:solidFill>
+                  <a:schemeClr val="tx1"/>
+                </a:solidFill>
+                <a:latin typeface="+mn-lt"/>
+                <a:ea typeface="+mn-ea"/>
+                <a:cs typeface="+mn-cs"/>
+              </a:defRPr>
+            </a:lvl4pPr>
+            <a:lvl5pPr marL="1828800" algn="l" defTabSz="914400" rtl="0" eaLnBrk="1" latinLnBrk="0" hangingPunct="1">
+              <a:defRPr sz="1800" kern="1200">
+                <a:solidFill>
+                  <a:schemeClr val="tx1"/>
+                </a:solidFill>
+                <a:latin typeface="+mn-lt"/>
+                <a:ea typeface="+mn-ea"/>
+                <a:cs typeface="+mn-cs"/>
+              </a:defRPr>
+            </a:lvl5pPr>
+            <a:lvl6pPr marL="2286000" algn="l" defTabSz="914400" rtl="0" eaLnBrk="1" latinLnBrk="0" hangingPunct="1">
+              <a:defRPr sz="1800" kern="1200">
+                <a:solidFill>
+                  <a:schemeClr val="tx1"/>
+                </a:solidFill>
+                <a:latin typeface="+mn-lt"/>
+                <a:ea typeface="+mn-ea"/>
+                <a:cs typeface="+mn-cs"/>
+              </a:defRPr>
+            </a:lvl6pPr>
+            <a:lvl7pPr marL="2743200" algn="l" defTabSz="914400" rtl="0" eaLnBrk="1" latinLnBrk="0" hangingPunct="1">
+              <a:defRPr sz="1800" kern="1200">
+                <a:solidFill>
+                  <a:schemeClr val="tx1"/>
+                </a:solidFill>
+                <a:latin typeface="+mn-lt"/>
+                <a:ea typeface="+mn-ea"/>
+                <a:cs typeface="+mn-cs"/>
+              </a:defRPr>
+            </a:lvl7pPr>
+            <a:lvl8pPr marL="3200400" algn="l" defTabSz="914400" rtl="0" eaLnBrk="1" latinLnBrk="0" hangingPunct="1">
+              <a:defRPr sz="1800" kern="1200">
+                <a:solidFill>
+                  <a:schemeClr val="tx1"/>
+                </a:solidFill>
+                <a:latin typeface="+mn-lt"/>
+                <a:ea typeface="+mn-ea"/>
+                <a:cs typeface="+mn-cs"/>
+              </a:defRPr>
+            </a:lvl8pPr>
+            <a:lvl9pPr marL="3657600" algn="l" defTabSz="914400" rtl="0" eaLnBrk="1" latinLnBrk="0" hangingPunct="1">
+              <a:defRPr sz="1800" kern="1200">
+                <a:solidFill>
+                  <a:schemeClr val="tx1"/>
+                </a:solidFill>
+                <a:latin typeface="+mn-lt"/>
+                <a:ea typeface="+mn-ea"/>
+                <a:cs typeface="+mn-cs"/>
+              </a:defRPr>
+            </a:lvl9pPr>
+          </a:lstStyle>
+          <a:p>
+            <a:endParaRPr lang="en-US" sz="2400" b="1">
+              <a:solidFill>
+                <a:srgbClr val="7030A0"/>
+              </a:solidFill>
+              <a:latin typeface="Assistant" pitchFamily="2" charset="-79"/>
+              <a:cs typeface="Assistant" pitchFamily="2" charset="-79"/>
+            </a:endParaRPr>
+          </a:p>
+          <a:p>
+            <a:endParaRPr lang="en-US" sz="2400" b="1">
+              <a:solidFill>
+                <a:srgbClr val="7030A0"/>
+              </a:solidFill>
+              <a:latin typeface="Assistant" pitchFamily="2" charset="-79"/>
+              <a:cs typeface="Assistant" pitchFamily="2" charset="-79"/>
+            </a:endParaRPr>
+          </a:p>
+          <a:p>
+            <a:r>
+              <a:rPr lang="en-US" sz="2400" b="1">
+                <a:solidFill>
+                  <a:srgbClr val="00A0E1"/>
+                </a:solidFill>
+                <a:latin typeface="Assistant" pitchFamily="2" charset="-79"/>
+                <a:cs typeface="Assistant" pitchFamily="2" charset="-79"/>
+              </a:rPr>
+              <a:t>   </a:t>
+            </a:r>
+            <a:endParaRPr lang="en-US" sz="2400" b="1" dirty="0">
+              <a:solidFill>
+                <a:srgbClr val="00A0E1"/>
+              </a:solidFill>
+              <a:latin typeface="Assistant" pitchFamily="2" charset="-79"/>
+              <a:cs typeface="Assistant" pitchFamily="2" charset="-79"/>
+            </a:endParaRPr>
+          </a:p>
+        </p:txBody>
+      </p:sp>
+      <p:sp>
+        <p:nvSpPr>
+          <p:cNvPr id="6" name="TextBox 5">
+            <a:extLst>
+              <a:ext uri="{FF2B5EF4-FFF2-40B4-BE49-F238E27FC236}">
+                <a16:creationId xmlns:a16="http://schemas.microsoft.com/office/drawing/2014/main" id="{06A4B648-05BE-03EB-D1AD-5BD4B922EF2D}"/>
+              </a:ext>
+            </a:extLst>
+          </p:cNvPr>
+          <p:cNvSpPr txBox="1"/>
+          <p:nvPr/>
+        </p:nvSpPr>
+        <p:spPr>
+          <a:xfrm>
+            <a:off x="1518047" y="4929187"/>
+            <a:ext cx="7878363" cy="461665"/>
+          </a:xfrm>
+          <a:prstGeom prst="rect">
+            <a:avLst/>
+          </a:prstGeom>
+          <a:noFill/>
+        </p:spPr>
+        <p:txBody>
+          <a:bodyPr rot="0" spcFirstLastPara="0" vertOverflow="overflow" horzOverflow="overflow" vert="horz" wrap="square" lIns="91440" tIns="45720" rIns="91440" bIns="45720" numCol="1" spcCol="0" rtlCol="0" fromWordArt="0" anchor="t" anchorCtr="0" forceAA="0" compatLnSpc="1">
+            <a:prstTxWarp prst="textNoShape">
+              <a:avLst/>
+            </a:prstTxWarp>
+            <a:spAutoFit/>
+          </a:bodyPr>
+          <a:lstStyle/>
+          <a:p>
+            <a:pPr rtl="0"/>
+            <a:endParaRPr lang="en-US" sz="2400">
+              <a:cs typeface="Segoe UI"/>
+            </a:endParaRPr>
+          </a:p>
+        </p:txBody>
+      </p:sp>
+      <p:sp>
+        <p:nvSpPr>
+          <p:cNvPr id="2" name="Title 6">
+            <a:extLst>
+              <a:ext uri="{FF2B5EF4-FFF2-40B4-BE49-F238E27FC236}">
+                <a16:creationId xmlns:a16="http://schemas.microsoft.com/office/drawing/2014/main" id="{223292A2-BB5C-E829-4FE8-6EED9FD4CBBD}"/>
+              </a:ext>
+            </a:extLst>
+          </p:cNvPr>
+          <p:cNvSpPr>
+            <a:spLocks noGrp="1"/>
+          </p:cNvSpPr>
+          <p:nvPr>
+            <p:ph type="title"/>
+          </p:nvPr>
+        </p:nvSpPr>
+        <p:spPr>
+          <a:xfrm>
+            <a:off x="1029731" y="177348"/>
+            <a:ext cx="9036908" cy="654674"/>
+          </a:xfrm>
+        </p:spPr>
+        <p:txBody>
+          <a:bodyPr/>
+          <a:lstStyle/>
+          <a:p>
+            <a:pPr algn="ctr"/>
+            <a:r>
+              <a:rPr lang="en-US" b="1" dirty="0">
+                <a:solidFill>
+                  <a:srgbClr val="000000"/>
+                </a:solidFill>
+                <a:latin typeface="Assistant" pitchFamily="2" charset="-79"/>
+                <a:ea typeface="+mj-lt"/>
+                <a:cs typeface="Assistant" pitchFamily="2" charset="-79"/>
+              </a:rPr>
+              <a:t> Image anonymization </a:t>
+            </a:r>
+            <a:endParaRPr lang="en-NL" dirty="0"/>
+          </a:p>
+        </p:txBody>
+      </p:sp>
+      <p:sp>
+        <p:nvSpPr>
+          <p:cNvPr id="13" name="TextBox 12">
+            <a:extLst>
+              <a:ext uri="{FF2B5EF4-FFF2-40B4-BE49-F238E27FC236}">
+                <a16:creationId xmlns:a16="http://schemas.microsoft.com/office/drawing/2014/main" id="{E65974A0-21C0-2F1D-D9BF-1419456DDDCF}"/>
+              </a:ext>
+            </a:extLst>
+          </p:cNvPr>
+          <p:cNvSpPr txBox="1"/>
+          <p:nvPr/>
+        </p:nvSpPr>
+        <p:spPr>
+          <a:xfrm>
+            <a:off x="6023729" y="1836821"/>
+            <a:ext cx="5137607" cy="954107"/>
+          </a:xfrm>
+          <a:prstGeom prst="rect">
+            <a:avLst/>
+          </a:prstGeom>
+          <a:noFill/>
+        </p:spPr>
+        <p:txBody>
+          <a:bodyPr wrap="square" rtlCol="0">
+            <a:spAutoFit/>
+          </a:bodyPr>
+          <a:lstStyle/>
+          <a:p>
+            <a:endParaRPr lang="en-US" sz="2800" b="1">
+              <a:solidFill>
+                <a:srgbClr val="3E1B59"/>
+              </a:solidFill>
+              <a:latin typeface="Assistant" pitchFamily="2" charset="-79"/>
+              <a:cs typeface="Assistant" pitchFamily="2" charset="-79"/>
+            </a:endParaRPr>
+          </a:p>
+          <a:p>
+            <a:endParaRPr lang="LID4096" sz="2800" dirty="0"/>
+          </a:p>
+        </p:txBody>
+      </p:sp>
+      <p:sp>
+        <p:nvSpPr>
+          <p:cNvPr id="8" name="TextBox 7">
+            <a:extLst>
+              <a:ext uri="{FF2B5EF4-FFF2-40B4-BE49-F238E27FC236}">
+                <a16:creationId xmlns:a16="http://schemas.microsoft.com/office/drawing/2014/main" id="{4ED5200B-9061-FF5E-1DA1-A9102E988D11}"/>
+              </a:ext>
+            </a:extLst>
+          </p:cNvPr>
+          <p:cNvSpPr txBox="1"/>
+          <p:nvPr/>
+        </p:nvSpPr>
+        <p:spPr>
+          <a:xfrm>
+            <a:off x="2899954" y="6126654"/>
+            <a:ext cx="5852160" cy="246221"/>
+          </a:xfrm>
+          <a:prstGeom prst="rect">
+            <a:avLst/>
+          </a:prstGeom>
+          <a:noFill/>
+        </p:spPr>
+        <p:txBody>
+          <a:bodyPr wrap="square" rtlCol="0">
+            <a:spAutoFit/>
+          </a:bodyPr>
+          <a:lstStyle/>
+          <a:p>
+            <a:endParaRPr lang="LID4096" sz="1000" dirty="0"/>
+          </a:p>
+        </p:txBody>
+      </p:sp>
+      <p:sp>
+        <p:nvSpPr>
+          <p:cNvPr id="7" name="TextBox 6">
+            <a:extLst>
+              <a:ext uri="{FF2B5EF4-FFF2-40B4-BE49-F238E27FC236}">
+                <a16:creationId xmlns:a16="http://schemas.microsoft.com/office/drawing/2014/main" id="{E064D3F0-F6C9-AD7B-42E2-3F9C415F1122}"/>
+              </a:ext>
+            </a:extLst>
+          </p:cNvPr>
+          <p:cNvSpPr txBox="1"/>
+          <p:nvPr/>
+        </p:nvSpPr>
+        <p:spPr>
+          <a:xfrm>
+            <a:off x="262467" y="1100667"/>
+            <a:ext cx="11429999" cy="4401205"/>
+          </a:xfrm>
+          <a:prstGeom prst="rect">
+            <a:avLst/>
+          </a:prstGeom>
+          <a:noFill/>
+        </p:spPr>
+        <p:txBody>
+          <a:bodyPr wrap="square">
+            <a:spAutoFit/>
+          </a:bodyPr>
+          <a:lstStyle/>
+          <a:p>
+            <a:r>
+              <a:rPr lang="en-US" sz="2000" b="1" dirty="0"/>
+              <a:t>Key Points</a:t>
+            </a:r>
+          </a:p>
+          <a:p>
+            <a:endParaRPr lang="en-US" sz="2000" b="1" dirty="0"/>
+          </a:p>
+          <a:p>
+            <a:pPr>
+              <a:buFont typeface="Arial" panose="020B0604020202020204" pitchFamily="34" charset="0"/>
+              <a:buChar char="•"/>
+            </a:pPr>
+            <a:r>
+              <a:rPr lang="en-US" sz="2000" dirty="0"/>
+              <a:t>Certain metadata should almost always be removed from DICOM files before sharing</a:t>
+            </a:r>
+          </a:p>
+          <a:p>
+            <a:pPr>
+              <a:buFont typeface="Arial" panose="020B0604020202020204" pitchFamily="34" charset="0"/>
+              <a:buChar char="•"/>
+            </a:pPr>
+            <a:endParaRPr lang="en-US" sz="2000" dirty="0"/>
+          </a:p>
+          <a:p>
+            <a:pPr>
+              <a:buFont typeface="Arial" panose="020B0604020202020204" pitchFamily="34" charset="0"/>
+              <a:buChar char="•"/>
+            </a:pPr>
+            <a:r>
+              <a:rPr lang="en-US" sz="2000" dirty="0"/>
+              <a:t>Sharing only image files such as JPEGs or </a:t>
+            </a:r>
+            <a:r>
+              <a:rPr lang="en-US" sz="2000" dirty="0" err="1"/>
+              <a:t>NIfTI</a:t>
+            </a:r>
+            <a:r>
+              <a:rPr lang="en-US" sz="2000" dirty="0"/>
+              <a:t> can mitigate risks associated with metadata</a:t>
+            </a:r>
+          </a:p>
+          <a:p>
+            <a:pPr>
+              <a:buFont typeface="Arial" panose="020B0604020202020204" pitchFamily="34" charset="0"/>
+              <a:buChar char="•"/>
+            </a:pPr>
+            <a:endParaRPr lang="en-US" sz="2000" dirty="0"/>
+          </a:p>
+          <a:p>
+            <a:pPr>
+              <a:buFont typeface="Arial" panose="020B0604020202020204" pitchFamily="34" charset="0"/>
+              <a:buChar char="•"/>
+            </a:pPr>
+            <a:r>
+              <a:rPr lang="en-US" sz="2000" dirty="0"/>
+              <a:t>Imaging data alone, even without explicit metadata, can sometimes lead to patient identification</a:t>
+            </a:r>
+          </a:p>
+          <a:p>
+            <a:pPr>
+              <a:buFont typeface="Arial" panose="020B0604020202020204" pitchFamily="34" charset="0"/>
+              <a:buChar char="•"/>
+            </a:pPr>
+            <a:endParaRPr lang="en-US" sz="2000" dirty="0"/>
+          </a:p>
+          <a:p>
+            <a:pPr>
+              <a:buFont typeface="Arial" panose="020B0604020202020204" pitchFamily="34" charset="0"/>
+              <a:buChar char="•"/>
+            </a:pPr>
+            <a:r>
+              <a:rPr lang="en-US" sz="2000" dirty="0"/>
+              <a:t>Automated tools are available to strip metadata from DICOMs, but manual verification is necessary due to inconsistencies in how fields are utilized.</a:t>
+            </a:r>
+          </a:p>
+          <a:p>
+            <a:pPr>
+              <a:buFont typeface="Arial" panose="020B0604020202020204" pitchFamily="34" charset="0"/>
+              <a:buChar char="•"/>
+            </a:pPr>
+            <a:endParaRPr lang="en-US" sz="2000" dirty="0"/>
+          </a:p>
+          <a:p>
+            <a:pPr>
+              <a:buFont typeface="Arial" panose="020B0604020202020204" pitchFamily="34" charset="0"/>
+              <a:buChar char="•"/>
+            </a:pPr>
+            <a:r>
+              <a:rPr lang="en-US" sz="2000" dirty="0"/>
+              <a:t>Tools exist to deface images to further protect </a:t>
+            </a:r>
+            <a:r>
+              <a:rPr lang="en-US" sz="2000"/>
+              <a:t>patient identity</a:t>
+            </a:r>
+          </a:p>
+          <a:p>
+            <a:pPr>
+              <a:buFont typeface="Arial" panose="020B0604020202020204" pitchFamily="34" charset="0"/>
+              <a:buChar char="•"/>
+            </a:pPr>
+            <a:endParaRPr lang="en-US" sz="2000" dirty="0"/>
+          </a:p>
+          <a:p>
+            <a:pPr>
+              <a:buFont typeface="Arial" panose="020B0604020202020204" pitchFamily="34" charset="0"/>
+              <a:buChar char="•"/>
+            </a:pPr>
+            <a:r>
+              <a:rPr lang="en-US" sz="2000" dirty="0"/>
+              <a:t>Several Python libraries enable access to DICOM metadata</a:t>
+            </a:r>
+          </a:p>
+        </p:txBody>
+      </p:sp>
+    </p:spTree>
+    <p:extLst>
+      <p:ext uri="{BB962C8B-B14F-4D97-AF65-F5344CB8AC3E}">
+        <p14:creationId xmlns:p14="http://schemas.microsoft.com/office/powerpoint/2010/main" val="2440874211"/>
       </p:ext>
     </p:extLst>
   </p:cSld>

</xml_diff>